<commit_message>
Presentacion con pantallazo de GitHub
</commit_message>
<xml_diff>
--- a/Gogym nuevo formato.pptx
+++ b/Gogym nuevo formato.pptx
@@ -16,14 +16,15 @@
     <p:sldId id="275" r:id="rId10"/>
     <p:sldId id="274" r:id="rId11"/>
     <p:sldId id="277" r:id="rId12"/>
-    <p:sldId id="278" r:id="rId13"/>
-    <p:sldId id="279" r:id="rId14"/>
-    <p:sldId id="280" r:id="rId15"/>
-    <p:sldId id="281" r:id="rId16"/>
-    <p:sldId id="282" r:id="rId17"/>
-    <p:sldId id="283" r:id="rId18"/>
-    <p:sldId id="284" r:id="rId19"/>
-    <p:sldId id="262" r:id="rId20"/>
+    <p:sldId id="285" r:id="rId13"/>
+    <p:sldId id="278" r:id="rId14"/>
+    <p:sldId id="279" r:id="rId15"/>
+    <p:sldId id="280" r:id="rId16"/>
+    <p:sldId id="281" r:id="rId17"/>
+    <p:sldId id="282" r:id="rId18"/>
+    <p:sldId id="283" r:id="rId19"/>
+    <p:sldId id="284" r:id="rId20"/>
+    <p:sldId id="262" r:id="rId21"/>
   </p:sldIdLst>
   <p:sldSz cx="9144000" cy="5143500" type="screen16x9"/>
   <p:notesSz cx="6858000" cy="9144000"/>
@@ -2253,8 +2254,8 @@
         </p:nvSpPr>
         <p:spPr>
           <a:xfrm>
-            <a:off x="382867" y="249495"/>
-            <a:ext cx="5294919" cy="646331"/>
+            <a:off x="731035" y="249459"/>
+            <a:ext cx="7681928" cy="646331"/>
           </a:xfrm>
           <a:prstGeom prst="rect">
             <a:avLst/>
@@ -2267,133 +2268,64 @@
           </a:bodyPr>
           <a:lstStyle/>
           <a:p>
-            <a:r>
-              <a:rPr lang="es-CO" sz="3600" b="1" dirty="0">
-                <a:solidFill>
-                  <a:schemeClr val="bg1"/>
-                </a:solidFill>
-              </a:rPr>
-              <a:t>M</a:t>
-            </a:r>
             <a:r>
               <a:rPr lang="es-ES" sz="3600" b="1" dirty="0">
                 <a:solidFill>
                   <a:schemeClr val="bg1"/>
                 </a:solidFill>
               </a:rPr>
-              <a:t>odificaciones realizadas</a:t>
-            </a:r>
-          </a:p>
-        </p:txBody>
-      </p:sp>
-      <p:sp>
-        <p:nvSpPr>
-          <p:cNvPr id="3" name="Rectángulo 2">
+              <a:t>GitHub: </a:t>
+            </a:r>
+            <a:r>
+              <a:rPr lang="es-ES" sz="2000" b="1" dirty="0">
+                <a:solidFill>
+                  <a:schemeClr val="bg1"/>
+                </a:solidFill>
+              </a:rPr>
+              <a:t>https://github.com/danielgiraldod12/gogym </a:t>
+            </a:r>
+            <a:endParaRPr lang="es-ES" sz="3600" b="1" dirty="0">
+              <a:solidFill>
+                <a:schemeClr val="bg1"/>
+              </a:solidFill>
+            </a:endParaRPr>
+          </a:p>
+        </p:txBody>
+      </p:sp>
+      <p:pic>
+        <p:nvPicPr>
+          <p:cNvPr id="4" name="Imagen 3">
             <a:extLst>
               <a:ext uri="{FF2B5EF4-FFF2-40B4-BE49-F238E27FC236}">
-                <a16:creationId xmlns:a16="http://schemas.microsoft.com/office/drawing/2014/main" id="{9EF13BAC-BDB3-465C-AFA6-E8EF45B77350}"/>
+                <a16:creationId xmlns:a16="http://schemas.microsoft.com/office/drawing/2014/main" id="{427EA835-6EBD-41EF-9B95-28F71711587B}"/>
               </a:ext>
             </a:extLst>
           </p:cNvPr>
-          <p:cNvSpPr/>
-          <p:nvPr/>
-        </p:nvSpPr>
-        <p:spPr>
-          <a:xfrm>
-            <a:off x="244643" y="1417133"/>
-            <a:ext cx="8325197" cy="369332"/>
-          </a:xfrm>
-          <a:prstGeom prst="rect">
-            <a:avLst/>
-          </a:prstGeom>
-        </p:spPr>
-        <p:txBody>
-          <a:bodyPr wrap="square">
-            <a:spAutoFit/>
-          </a:bodyPr>
-          <a:lstStyle/>
-          <a:p>
-            <a:pPr algn="just"/>
-            <a:endParaRPr lang="es-CO" dirty="0"/>
-          </a:p>
-        </p:txBody>
-      </p:sp>
-      <p:sp>
-        <p:nvSpPr>
-          <p:cNvPr id="4" name="Rectángulo 3">
-            <a:extLst>
-              <a:ext uri="{FF2B5EF4-FFF2-40B4-BE49-F238E27FC236}">
-                <a16:creationId xmlns:a16="http://schemas.microsoft.com/office/drawing/2014/main" id="{F594AFE1-BD1E-47AB-9B17-208EB9CE0E83}"/>
-              </a:ext>
-            </a:extLst>
-          </p:cNvPr>
-          <p:cNvSpPr/>
-          <p:nvPr/>
-        </p:nvSpPr>
-        <p:spPr>
-          <a:xfrm>
-            <a:off x="244643" y="1919348"/>
-            <a:ext cx="8463422" cy="646331"/>
-          </a:xfrm>
-          <a:prstGeom prst="rect">
-            <a:avLst/>
-          </a:prstGeom>
-        </p:spPr>
-        <p:txBody>
-          <a:bodyPr wrap="square">
-            <a:spAutoFit/>
-          </a:bodyPr>
-          <a:lstStyle/>
-          <a:p>
-            <a:r>
-              <a:rPr lang="es-ES" dirty="0"/>
-              <a:t>Sistematizar el formato de asistencia y tabla de torneos de futbol   que se implementan en el gimnasio  del centro textil de gestión industrial  e información general de este.</a:t>
-            </a:r>
-          </a:p>
-        </p:txBody>
-      </p:sp>
-      <p:sp>
-        <p:nvSpPr>
-          <p:cNvPr id="5" name="Rectángulo 4">
-            <a:extLst>
-              <a:ext uri="{FF2B5EF4-FFF2-40B4-BE49-F238E27FC236}">
-                <a16:creationId xmlns:a16="http://schemas.microsoft.com/office/drawing/2014/main" id="{1A4A88F0-D296-46D4-BFC4-6CA5263E955E}"/>
-              </a:ext>
-            </a:extLst>
-          </p:cNvPr>
-          <p:cNvSpPr/>
-          <p:nvPr/>
-        </p:nvSpPr>
-        <p:spPr>
-          <a:xfrm>
-            <a:off x="244643" y="1389798"/>
-            <a:ext cx="4572000" cy="369332"/>
-          </a:xfrm>
-          <a:prstGeom prst="rect">
-            <a:avLst/>
-          </a:prstGeom>
-        </p:spPr>
-        <p:txBody>
-          <a:bodyPr>
-            <a:spAutoFit/>
-          </a:bodyPr>
-          <a:lstStyle/>
-          <a:p>
-            <a:r>
-              <a:rPr lang="es-CO" dirty="0"/>
-              <a:t>O</a:t>
-            </a:r>
-            <a:r>
-              <a:rPr lang="es-ES" dirty="0"/>
-              <a:t>bjetivo general anterior</a:t>
-            </a:r>
-          </a:p>
-        </p:txBody>
-      </p:sp>
+          <p:cNvPicPr>
+            <a:picLocks noChangeAspect="1"/>
+          </p:cNvPicPr>
+          <p:nvPr/>
+        </p:nvPicPr>
+        <p:blipFill>
+          <a:blip r:embed="rId2"/>
+          <a:stretch>
+            <a:fillRect/>
+          </a:stretch>
+        </p:blipFill>
+        <p:spPr>
+          <a:xfrm>
+            <a:off x="1180214" y="1080144"/>
+            <a:ext cx="6783572" cy="4063356"/>
+          </a:xfrm>
+          <a:prstGeom prst="rect">
+            <a:avLst/>
+          </a:prstGeom>
+        </p:spPr>
+      </p:pic>
     </p:spTree>
     <p:extLst>
       <p:ext uri="{BB962C8B-B14F-4D97-AF65-F5344CB8AC3E}">
-        <p14:creationId xmlns:p14="http://schemas.microsoft.com/office/powerpoint/2010/main" val="2561133890"/>
+        <p14:creationId xmlns:p14="http://schemas.microsoft.com/office/powerpoint/2010/main" val="293348696"/>
       </p:ext>
     </p:extLst>
   </p:cSld>
@@ -2508,7 +2440,7 @@
         <p:spPr>
           <a:xfrm>
             <a:off x="244643" y="1919348"/>
-            <a:ext cx="8463422" cy="2031325"/>
+            <a:ext cx="8463422" cy="646331"/>
           </a:xfrm>
           <a:prstGeom prst="rect">
             <a:avLst/>
@@ -2520,38 +2452,9 @@
           </a:bodyPr>
           <a:lstStyle/>
           <a:p>
-            <a:pPr lvl="0"/>
             <a:r>
               <a:rPr lang="es-ES" dirty="0"/>
-              <a:t>-Identificar las necesidades de software en el gimnasio SENA pedregal.</a:t>
-            </a:r>
-          </a:p>
-          <a:p>
-            <a:pPr lvl="0"/>
-            <a:r>
-              <a:rPr lang="es-ES" dirty="0"/>
-              <a:t>-Analizar los requisitos identificados en los procesos operativos, técnicos y administrativos del gimnasio del CTGI.</a:t>
-            </a:r>
-          </a:p>
-          <a:p>
-            <a:pPr lvl="0"/>
-            <a:r>
-              <a:rPr lang="es-ES" dirty="0"/>
-              <a:t>-Diseñar el sistema de información según los requisitos analizados.</a:t>
-            </a:r>
-          </a:p>
-          <a:p>
-            <a:pPr lvl="0"/>
-            <a:r>
-              <a:rPr lang="es-ES" dirty="0"/>
-              <a:t>-Aplicar normas de calidad de acuerdo a los estándares nacionales e internacionales durante todo el proceso del desarrollo del software.</a:t>
-            </a:r>
-          </a:p>
-          <a:p>
-            <a:pPr lvl="0"/>
-            <a:r>
-              <a:rPr lang="es-ES" dirty="0"/>
-              <a:t>-Implementar la solución que satisfaga las necesidades del gimnasio del CTGI.</a:t>
+              <a:t>Sistematizar el formato de asistencia y tabla de torneos de futbol   que se implementan en el gimnasio  del centro textil de gestión industrial  e información general de este.</a:t>
             </a:r>
           </a:p>
         </p:txBody>
@@ -2589,7 +2492,7 @@
             </a:r>
             <a:r>
               <a:rPr lang="es-ES" dirty="0"/>
-              <a:t>bjetivos específicos anterior</a:t>
+              <a:t>bjetivo general anterior</a:t>
             </a:r>
           </a:p>
         </p:txBody>
@@ -2597,7 +2500,7 @@
     </p:spTree>
     <p:extLst>
       <p:ext uri="{BB962C8B-B14F-4D97-AF65-F5344CB8AC3E}">
-        <p14:creationId xmlns:p14="http://schemas.microsoft.com/office/powerpoint/2010/main" val="533392430"/>
+        <p14:creationId xmlns:p14="http://schemas.microsoft.com/office/powerpoint/2010/main" val="2561133890"/>
       </p:ext>
     </p:extLst>
   </p:cSld>
@@ -2712,7 +2615,7 @@
         <p:spPr>
           <a:xfrm>
             <a:off x="244643" y="1919348"/>
-            <a:ext cx="8463422" cy="646331"/>
+            <a:ext cx="8463422" cy="2031325"/>
           </a:xfrm>
           <a:prstGeom prst="rect">
             <a:avLst/>
@@ -2726,10 +2629,37 @@
           <a:p>
             <a:pPr lvl="0"/>
             <a:r>
-              <a:rPr lang="es-CO" dirty="0"/>
-              <a:t>Con este proyecto pensamos convertir el gimnasio en un lugar donde se ahorren ciertos procesos, por lo que se evitaría gastar tanto dinero en copias.</a:t>
-            </a:r>
-            <a:endParaRPr lang="es-ES" dirty="0"/>
+              <a:rPr lang="es-ES" dirty="0"/>
+              <a:t>-Identificar las necesidades de software en el gimnasio SENA pedregal.</a:t>
+            </a:r>
+          </a:p>
+          <a:p>
+            <a:pPr lvl="0"/>
+            <a:r>
+              <a:rPr lang="es-ES" dirty="0"/>
+              <a:t>-Analizar los requisitos identificados en los procesos operativos, técnicos y administrativos del gimnasio del CTGI.</a:t>
+            </a:r>
+          </a:p>
+          <a:p>
+            <a:pPr lvl="0"/>
+            <a:r>
+              <a:rPr lang="es-ES" dirty="0"/>
+              <a:t>-Diseñar el sistema de información según los requisitos analizados.</a:t>
+            </a:r>
+          </a:p>
+          <a:p>
+            <a:pPr lvl="0"/>
+            <a:r>
+              <a:rPr lang="es-ES" dirty="0"/>
+              <a:t>-Aplicar normas de calidad de acuerdo a los estándares nacionales e internacionales durante todo el proceso del desarrollo del software.</a:t>
+            </a:r>
+          </a:p>
+          <a:p>
+            <a:pPr lvl="0"/>
+            <a:r>
+              <a:rPr lang="es-ES" dirty="0"/>
+              <a:t>-Implementar la solución que satisfaga las necesidades del gimnasio del CTGI.</a:t>
+            </a:r>
           </a:p>
         </p:txBody>
       </p:sp>
@@ -2762,16 +2692,19 @@
           <a:p>
             <a:r>
               <a:rPr lang="es-CO" dirty="0"/>
-              <a:t>Impacto económico anterior</a:t>
-            </a:r>
-            <a:endParaRPr lang="es-ES" dirty="0"/>
+              <a:t>O</a:t>
+            </a:r>
+            <a:r>
+              <a:rPr lang="es-ES" dirty="0"/>
+              <a:t>bjetivos específicos anterior</a:t>
+            </a:r>
           </a:p>
         </p:txBody>
       </p:sp>
     </p:spTree>
     <p:extLst>
       <p:ext uri="{BB962C8B-B14F-4D97-AF65-F5344CB8AC3E}">
-        <p14:creationId xmlns:p14="http://schemas.microsoft.com/office/powerpoint/2010/main" val="887887634"/>
+        <p14:creationId xmlns:p14="http://schemas.microsoft.com/office/powerpoint/2010/main" val="533392430"/>
       </p:ext>
     </p:extLst>
   </p:cSld>
@@ -2901,7 +2834,7 @@
             <a:pPr lvl="0"/>
             <a:r>
               <a:rPr lang="es-CO" dirty="0"/>
-              <a:t>Este proyecto busca reducir el consumo del papel lo cual ayuda a que no haya tala de árboles para la creación de este brindando así un ambiente sano.</a:t>
+              <a:t>Con este proyecto pensamos convertir el gimnasio en un lugar donde se ahorren ciertos procesos, por lo que se evitaría gastar tanto dinero en copias.</a:t>
             </a:r>
             <a:endParaRPr lang="es-ES" dirty="0"/>
           </a:p>
@@ -2936,7 +2869,7 @@
           <a:p>
             <a:r>
               <a:rPr lang="es-CO" dirty="0"/>
-              <a:t>Impacto ambiental anterior</a:t>
+              <a:t>Impacto económico anterior</a:t>
             </a:r>
             <a:endParaRPr lang="es-ES" dirty="0"/>
           </a:p>
@@ -2945,7 +2878,7 @@
     </p:spTree>
     <p:extLst>
       <p:ext uri="{BB962C8B-B14F-4D97-AF65-F5344CB8AC3E}">
-        <p14:creationId xmlns:p14="http://schemas.microsoft.com/office/powerpoint/2010/main" val="1320510778"/>
+        <p14:creationId xmlns:p14="http://schemas.microsoft.com/office/powerpoint/2010/main" val="887887634"/>
       </p:ext>
     </p:extLst>
   </p:cSld>
@@ -3060,7 +2993,7 @@
         <p:spPr>
           <a:xfrm>
             <a:off x="244643" y="1919348"/>
-            <a:ext cx="8463422" cy="1200329"/>
+            <a:ext cx="8463422" cy="646331"/>
           </a:xfrm>
           <a:prstGeom prst="rect">
             <a:avLst/>
@@ -3074,12 +3007,8 @@
           <a:p>
             <a:pPr lvl="0"/>
             <a:r>
-              <a:rPr lang="es-CO" b="1" dirty="0"/>
-              <a:t> </a:t>
-            </a:r>
-            <a:r>
               <a:rPr lang="es-CO" dirty="0"/>
-              <a:t>El uso de los lenguajes de programación para dar una solución a la problemática que presenta el gimnasio del SENA Pedregal desarrollando una plataforma web que permita sistematizar los procesos de inscripción torneos de futbol, infundir información, verificar asistencia.</a:t>
+              <a:t>Este proyecto busca reducir el consumo del papel lo cual ayuda a que no haya tala de árboles para la creación de este brindando así un ambiente sano.</a:t>
             </a:r>
             <a:endParaRPr lang="es-ES" dirty="0"/>
           </a:p>
@@ -3114,7 +3043,7 @@
           <a:p>
             <a:r>
               <a:rPr lang="es-CO" dirty="0"/>
-              <a:t>Impacto tecnológico anterior</a:t>
+              <a:t>Impacto ambiental anterior</a:t>
             </a:r>
             <a:endParaRPr lang="es-ES" dirty="0"/>
           </a:p>
@@ -3123,7 +3052,7 @@
     </p:spTree>
     <p:extLst>
       <p:ext uri="{BB962C8B-B14F-4D97-AF65-F5344CB8AC3E}">
-        <p14:creationId xmlns:p14="http://schemas.microsoft.com/office/powerpoint/2010/main" val="1840227317"/>
+        <p14:creationId xmlns:p14="http://schemas.microsoft.com/office/powerpoint/2010/main" val="1320510778"/>
       </p:ext>
     </p:extLst>
   </p:cSld>
@@ -3225,6 +3154,46 @@
       </p:sp>
       <p:sp>
         <p:nvSpPr>
+          <p:cNvPr id="4" name="Rectángulo 3">
+            <a:extLst>
+              <a:ext uri="{FF2B5EF4-FFF2-40B4-BE49-F238E27FC236}">
+                <a16:creationId xmlns:a16="http://schemas.microsoft.com/office/drawing/2014/main" id="{F594AFE1-BD1E-47AB-9B17-208EB9CE0E83}"/>
+              </a:ext>
+            </a:extLst>
+          </p:cNvPr>
+          <p:cNvSpPr/>
+          <p:nvPr/>
+        </p:nvSpPr>
+        <p:spPr>
+          <a:xfrm>
+            <a:off x="244643" y="1919348"/>
+            <a:ext cx="8463422" cy="1200329"/>
+          </a:xfrm>
+          <a:prstGeom prst="rect">
+            <a:avLst/>
+          </a:prstGeom>
+        </p:spPr>
+        <p:txBody>
+          <a:bodyPr wrap="square">
+            <a:spAutoFit/>
+          </a:bodyPr>
+          <a:lstStyle/>
+          <a:p>
+            <a:pPr lvl="0"/>
+            <a:r>
+              <a:rPr lang="es-CO" b="1" dirty="0"/>
+              <a:t> </a:t>
+            </a:r>
+            <a:r>
+              <a:rPr lang="es-CO" dirty="0"/>
+              <a:t>El uso de los lenguajes de programación para dar una solución a la problemática que presenta el gimnasio del SENA Pedregal desarrollando una plataforma web que permita sistematizar los procesos de inscripción torneos de futbol, infundir información, verificar asistencia.</a:t>
+            </a:r>
+            <a:endParaRPr lang="es-ES" dirty="0"/>
+          </a:p>
+        </p:txBody>
+      </p:sp>
+      <p:sp>
+        <p:nvSpPr>
           <p:cNvPr id="5" name="Rectángulo 4">
             <a:extLst>
               <a:ext uri="{FF2B5EF4-FFF2-40B4-BE49-F238E27FC236}">
@@ -3252,46 +3221,16 @@
           <a:p>
             <a:r>
               <a:rPr lang="es-CO" dirty="0"/>
-              <a:t>Logo anterior</a:t>
+              <a:t>Impacto tecnológico anterior</a:t>
             </a:r>
             <a:endParaRPr lang="es-ES" dirty="0"/>
           </a:p>
         </p:txBody>
       </p:sp>
-      <p:pic>
-        <p:nvPicPr>
-          <p:cNvPr id="6" name="Imagen 5">
-            <a:extLst>
-              <a:ext uri="{FF2B5EF4-FFF2-40B4-BE49-F238E27FC236}">
-                <a16:creationId xmlns:a16="http://schemas.microsoft.com/office/drawing/2014/main" id="{578EBFE6-2913-4E71-87C5-B80503ADFA03}"/>
-              </a:ext>
-            </a:extLst>
-          </p:cNvPr>
-          <p:cNvPicPr>
-            <a:picLocks noChangeAspect="1"/>
-          </p:cNvPicPr>
-          <p:nvPr/>
-        </p:nvPicPr>
-        <p:blipFill>
-          <a:blip r:embed="rId2"/>
-          <a:stretch>
-            <a:fillRect/>
-          </a:stretch>
-        </p:blipFill>
-        <p:spPr>
-          <a:xfrm>
-            <a:off x="2733232" y="1759130"/>
-            <a:ext cx="3677536" cy="3677536"/>
-          </a:xfrm>
-          <a:prstGeom prst="rect">
-            <a:avLst/>
-          </a:prstGeom>
-        </p:spPr>
-      </p:pic>
     </p:spTree>
     <p:extLst>
       <p:ext uri="{BB962C8B-B14F-4D97-AF65-F5344CB8AC3E}">
-        <p14:creationId xmlns:p14="http://schemas.microsoft.com/office/powerpoint/2010/main" val="2217013841"/>
+        <p14:creationId xmlns:p14="http://schemas.microsoft.com/office/powerpoint/2010/main" val="1840227317"/>
       </p:ext>
     </p:extLst>
   </p:cSld>
@@ -3420,7 +3359,7 @@
           <a:p>
             <a:r>
               <a:rPr lang="es-CO" dirty="0"/>
-              <a:t>Logo nuevo</a:t>
+              <a:t>Logo anterior</a:t>
             </a:r>
             <a:endParaRPr lang="es-ES" dirty="0"/>
           </a:p>
@@ -3431,7 +3370,7 @@
           <p:cNvPr id="6" name="Imagen 5">
             <a:extLst>
               <a:ext uri="{FF2B5EF4-FFF2-40B4-BE49-F238E27FC236}">
-                <a16:creationId xmlns:a16="http://schemas.microsoft.com/office/drawing/2014/main" id="{60551F13-8C1E-41E3-955C-179A61310B67}"/>
+                <a16:creationId xmlns:a16="http://schemas.microsoft.com/office/drawing/2014/main" id="{578EBFE6-2913-4E71-87C5-B80503ADFA03}"/>
               </a:ext>
             </a:extLst>
           </p:cNvPr>
@@ -3448,8 +3387,8 @@
         </p:blipFill>
         <p:spPr>
           <a:xfrm>
-            <a:off x="3143250" y="1910814"/>
-            <a:ext cx="2857500" cy="2857500"/>
+            <a:off x="2733232" y="1759130"/>
+            <a:ext cx="3677536" cy="3677536"/>
           </a:xfrm>
           <a:prstGeom prst="rect">
             <a:avLst/>
@@ -3459,7 +3398,7 @@
     </p:spTree>
     <p:extLst>
       <p:ext uri="{BB962C8B-B14F-4D97-AF65-F5344CB8AC3E}">
-        <p14:creationId xmlns:p14="http://schemas.microsoft.com/office/powerpoint/2010/main" val="1212536123"/>
+        <p14:creationId xmlns:p14="http://schemas.microsoft.com/office/powerpoint/2010/main" val="2217013841"/>
       </p:ext>
     </p:extLst>
   </p:cSld>
@@ -3486,10 +3425,148 @@
           <a:chExt cx="0" cy="0"/>
         </a:xfrm>
       </p:grpSpPr>
+      <p:sp>
+        <p:nvSpPr>
+          <p:cNvPr id="2" name="CuadroTexto 1"/>
+          <p:cNvSpPr txBox="1"/>
+          <p:nvPr/>
+        </p:nvSpPr>
+        <p:spPr>
+          <a:xfrm>
+            <a:off x="382867" y="249495"/>
+            <a:ext cx="5294919" cy="646331"/>
+          </a:xfrm>
+          <a:prstGeom prst="rect">
+            <a:avLst/>
+          </a:prstGeom>
+          <a:noFill/>
+        </p:spPr>
+        <p:txBody>
+          <a:bodyPr wrap="square" rtlCol="0">
+            <a:spAutoFit/>
+          </a:bodyPr>
+          <a:lstStyle/>
+          <a:p>
+            <a:r>
+              <a:rPr lang="es-CO" sz="3600" b="1" dirty="0">
+                <a:solidFill>
+                  <a:schemeClr val="bg1"/>
+                </a:solidFill>
+              </a:rPr>
+              <a:t>M</a:t>
+            </a:r>
+            <a:r>
+              <a:rPr lang="es-ES" sz="3600" b="1" dirty="0">
+                <a:solidFill>
+                  <a:schemeClr val="bg1"/>
+                </a:solidFill>
+              </a:rPr>
+              <a:t>odificaciones realizadas</a:t>
+            </a:r>
+          </a:p>
+        </p:txBody>
+      </p:sp>
+      <p:sp>
+        <p:nvSpPr>
+          <p:cNvPr id="3" name="Rectángulo 2">
+            <a:extLst>
+              <a:ext uri="{FF2B5EF4-FFF2-40B4-BE49-F238E27FC236}">
+                <a16:creationId xmlns:a16="http://schemas.microsoft.com/office/drawing/2014/main" id="{9EF13BAC-BDB3-465C-AFA6-E8EF45B77350}"/>
+              </a:ext>
+            </a:extLst>
+          </p:cNvPr>
+          <p:cNvSpPr/>
+          <p:nvPr/>
+        </p:nvSpPr>
+        <p:spPr>
+          <a:xfrm>
+            <a:off x="244643" y="1417133"/>
+            <a:ext cx="8325197" cy="369332"/>
+          </a:xfrm>
+          <a:prstGeom prst="rect">
+            <a:avLst/>
+          </a:prstGeom>
+        </p:spPr>
+        <p:txBody>
+          <a:bodyPr wrap="square">
+            <a:spAutoFit/>
+          </a:bodyPr>
+          <a:lstStyle/>
+          <a:p>
+            <a:pPr algn="just"/>
+            <a:endParaRPr lang="es-CO" dirty="0"/>
+          </a:p>
+        </p:txBody>
+      </p:sp>
+      <p:sp>
+        <p:nvSpPr>
+          <p:cNvPr id="5" name="Rectángulo 4">
+            <a:extLst>
+              <a:ext uri="{FF2B5EF4-FFF2-40B4-BE49-F238E27FC236}">
+                <a16:creationId xmlns:a16="http://schemas.microsoft.com/office/drawing/2014/main" id="{1A4A88F0-D296-46D4-BFC4-6CA5263E955E}"/>
+              </a:ext>
+            </a:extLst>
+          </p:cNvPr>
+          <p:cNvSpPr/>
+          <p:nvPr/>
+        </p:nvSpPr>
+        <p:spPr>
+          <a:xfrm>
+            <a:off x="244643" y="1389798"/>
+            <a:ext cx="4572000" cy="369332"/>
+          </a:xfrm>
+          <a:prstGeom prst="rect">
+            <a:avLst/>
+          </a:prstGeom>
+        </p:spPr>
+        <p:txBody>
+          <a:bodyPr>
+            <a:spAutoFit/>
+          </a:bodyPr>
+          <a:lstStyle/>
+          <a:p>
+            <a:r>
+              <a:rPr lang="es-CO" dirty="0"/>
+              <a:t>Logo nuevo</a:t>
+            </a:r>
+            <a:endParaRPr lang="es-ES" dirty="0"/>
+          </a:p>
+        </p:txBody>
+      </p:sp>
+      <p:pic>
+        <p:nvPicPr>
+          <p:cNvPr id="6" name="Imagen 5">
+            <a:extLst>
+              <a:ext uri="{FF2B5EF4-FFF2-40B4-BE49-F238E27FC236}">
+                <a16:creationId xmlns:a16="http://schemas.microsoft.com/office/drawing/2014/main" id="{60551F13-8C1E-41E3-955C-179A61310B67}"/>
+              </a:ext>
+            </a:extLst>
+          </p:cNvPr>
+          <p:cNvPicPr>
+            <a:picLocks noChangeAspect="1"/>
+          </p:cNvPicPr>
+          <p:nvPr/>
+        </p:nvPicPr>
+        <p:blipFill>
+          <a:blip r:embed="rId2"/>
+          <a:stretch>
+            <a:fillRect/>
+          </a:stretch>
+        </p:blipFill>
+        <p:spPr>
+          <a:xfrm>
+            <a:off x="3143250" y="1910814"/>
+            <a:ext cx="2857500" cy="2857500"/>
+          </a:xfrm>
+          <a:prstGeom prst="rect">
+            <a:avLst/>
+          </a:prstGeom>
+        </p:spPr>
+      </p:pic>
     </p:spTree>
     <p:extLst>
       <p:ext uri="{BB962C8B-B14F-4D97-AF65-F5344CB8AC3E}">
-        <p14:creationId xmlns:p14="http://schemas.microsoft.com/office/powerpoint/2010/main" val="3181596749"/>
+        <p14:creationId xmlns:p14="http://schemas.microsoft.com/office/powerpoint/2010/main" val="1212536123"/>
       </p:ext>
     </p:extLst>
   </p:cSld>
@@ -3599,6 +3676,36 @@
     <p:extLst>
       <p:ext uri="{BB962C8B-B14F-4D97-AF65-F5344CB8AC3E}">
         <p14:creationId xmlns:p14="http://schemas.microsoft.com/office/powerpoint/2010/main" val="3083268446"/>
+      </p:ext>
+    </p:extLst>
+  </p:cSld>
+  <p:clrMapOvr>
+    <a:masterClrMapping/>
+  </p:clrMapOvr>
+</p:sld>
+</file>
+
+<file path=ppt/slides/slide20.xml><?xml version="1.0" encoding="utf-8"?>
+<p:sld xmlns:a="http://schemas.openxmlformats.org/drawingml/2006/main" xmlns:r="http://schemas.openxmlformats.org/officeDocument/2006/relationships" xmlns:p="http://schemas.openxmlformats.org/presentationml/2006/main">
+  <p:cSld>
+    <p:spTree>
+      <p:nvGrpSpPr>
+        <p:cNvPr id="1" name=""/>
+        <p:cNvGrpSpPr/>
+        <p:nvPr/>
+      </p:nvGrpSpPr>
+      <p:grpSpPr>
+        <a:xfrm>
+          <a:off x="0" y="0"/>
+          <a:ext cx="0" cy="0"/>
+          <a:chOff x="0" y="0"/>
+          <a:chExt cx="0" cy="0"/>
+        </a:xfrm>
+      </p:grpSpPr>
+    </p:spTree>
+    <p:extLst>
+      <p:ext uri="{BB962C8B-B14F-4D97-AF65-F5344CB8AC3E}">
+        <p14:creationId xmlns:p14="http://schemas.microsoft.com/office/powerpoint/2010/main" val="3181596749"/>
       </p:ext>
     </p:extLst>
   </p:cSld>

</xml_diff>